<commit_message>
Added overall system diagram
</commit_message>
<xml_diff>
--- a/Report and Presentation/Final Presentation.pptx
+++ b/Report and Presentation/Final Presentation.pptx
@@ -7,11 +7,12 @@
   <p:sldIdLst>
     <p:sldId id="256" r:id="rId2"/>
     <p:sldId id="257" r:id="rId3"/>
-    <p:sldId id="258" r:id="rId4"/>
-    <p:sldId id="259" r:id="rId5"/>
-    <p:sldId id="261" r:id="rId6"/>
-    <p:sldId id="262" r:id="rId7"/>
-    <p:sldId id="263" r:id="rId8"/>
+    <p:sldId id="264" r:id="rId4"/>
+    <p:sldId id="258" r:id="rId5"/>
+    <p:sldId id="259" r:id="rId6"/>
+    <p:sldId id="261" r:id="rId7"/>
+    <p:sldId id="262" r:id="rId8"/>
+    <p:sldId id="263" r:id="rId9"/>
   </p:sldIdLst>
   <p:sldSz cx="12192000" cy="6858000"/>
   <p:notesSz cx="6858000" cy="9144000"/>
@@ -3416,8 +3417,8 @@
         </p:nvSpPr>
         <p:spPr>
           <a:xfrm>
-            <a:off x="1524000" y="351652"/>
-            <a:ext cx="9144000" cy="876255"/>
+            <a:off x="1524000" y="416969"/>
+            <a:ext cx="9144000" cy="863191"/>
           </a:xfrm>
         </p:spPr>
         <p:txBody>
@@ -3432,137 +3433,856 @@
                   <a:schemeClr val="bg1"/>
                 </a:solidFill>
               </a:rPr>
-              <a:t>Approach-Choosing the Data</a:t>
-            </a:r>
-          </a:p>
-        </p:txBody>
-      </p:sp>
-      <p:sp>
-        <p:nvSpPr>
-          <p:cNvPr id="3" name="Subtitle 2"/>
-          <p:cNvSpPr>
-            <a:spLocks noGrp="1"/>
-          </p:cNvSpPr>
-          <p:nvPr>
-            <p:ph type="subTitle" idx="1"/>
-          </p:nvPr>
+              <a:t>Overall Design</a:t>
+            </a:r>
+          </a:p>
+        </p:txBody>
+      </p:sp>
+      <p:sp>
+        <p:nvSpPr>
+          <p:cNvPr id="7" name="Rectangle 6"/>
+          <p:cNvSpPr/>
+          <p:nvPr/>
         </p:nvSpPr>
         <p:spPr>
           <a:xfrm>
-            <a:off x="1524000" y="1227907"/>
-            <a:ext cx="9144000" cy="4029893"/>
+            <a:off x="5569403" y="1280160"/>
+            <a:ext cx="1053193" cy="391886"/>
           </a:xfrm>
+          <a:prstGeom prst="rect">
+            <a:avLst/>
+          </a:prstGeom>
         </p:spPr>
-        <p:txBody>
-          <a:bodyPr/>
-          <a:lstStyle/>
-          <a:p>
-            <a:pPr marL="342900" indent="-342900" algn="l">
-              <a:buFont typeface="Arial" panose="020B0604020202020204" pitchFamily="34" charset="0"/>
-              <a:buChar char="•"/>
-            </a:pPr>
-            <a:r>
-              <a:rPr lang="en-US" dirty="0">
-                <a:solidFill>
-                  <a:schemeClr val="bg1"/>
-                </a:solidFill>
-              </a:rPr>
-              <a:t>Millions of reviews, only so much processing power</a:t>
-            </a:r>
-          </a:p>
-          <a:p>
-            <a:pPr marL="342900" indent="-342900" algn="l">
-              <a:buFont typeface="Arial" panose="020B0604020202020204" pitchFamily="34" charset="0"/>
-              <a:buChar char="•"/>
-            </a:pPr>
-            <a:r>
-              <a:rPr lang="en-US" dirty="0">
-                <a:solidFill>
-                  <a:schemeClr val="bg1"/>
-                </a:solidFill>
-              </a:rPr>
-              <a:t>Limiting problem space let’s us get more focused data</a:t>
-            </a:r>
-          </a:p>
-          <a:p>
-            <a:pPr marL="342900" indent="-342900" algn="l">
-              <a:buFont typeface="Arial" panose="020B0604020202020204" pitchFamily="34" charset="0"/>
-              <a:buChar char="•"/>
-            </a:pPr>
-            <a:endParaRPr lang="en-US" dirty="0">
-              <a:solidFill>
-                <a:schemeClr val="bg1"/>
-              </a:solidFill>
-            </a:endParaRPr>
-          </a:p>
-          <a:p>
-            <a:pPr marL="342900" indent="-342900" algn="l">
-              <a:buFont typeface="Arial" panose="020B0604020202020204" pitchFamily="34" charset="0"/>
-              <a:buChar char="•"/>
-            </a:pPr>
-            <a:r>
-              <a:rPr lang="en-US" dirty="0">
-                <a:solidFill>
-                  <a:schemeClr val="bg1"/>
-                </a:solidFill>
-              </a:rPr>
-              <a:t>Reduction</a:t>
-            </a:r>
-          </a:p>
-          <a:p>
-            <a:pPr marL="800100" lvl="1" indent="-342900" algn="l">
-              <a:buFont typeface="Arial" panose="020B0604020202020204" pitchFamily="34" charset="0"/>
-              <a:buChar char="•"/>
-            </a:pPr>
-            <a:r>
-              <a:rPr lang="en-US" dirty="0">
-                <a:solidFill>
-                  <a:schemeClr val="bg1"/>
-                </a:solidFill>
-              </a:rPr>
-              <a:t>Only businesses in Pittsburgh</a:t>
-            </a:r>
-          </a:p>
-          <a:p>
-            <a:pPr marL="800100" lvl="1" indent="-342900" algn="l">
-              <a:buFont typeface="Arial" panose="020B0604020202020204" pitchFamily="34" charset="0"/>
-              <a:buChar char="•"/>
-            </a:pPr>
-            <a:r>
-              <a:rPr lang="en-US" dirty="0">
-                <a:solidFill>
-                  <a:schemeClr val="bg1"/>
-                </a:solidFill>
-              </a:rPr>
-              <a:t>Removed several fields (check-ins, for instance)</a:t>
-            </a:r>
-          </a:p>
-          <a:p>
-            <a:pPr marL="800100" lvl="1" indent="-342900" algn="l">
-              <a:buFont typeface="Arial" panose="020B0604020202020204" pitchFamily="34" charset="0"/>
-              <a:buChar char="•"/>
-            </a:pPr>
-            <a:r>
-              <a:rPr lang="en-US" dirty="0">
-                <a:solidFill>
-                  <a:schemeClr val="bg1"/>
-                </a:solidFill>
-              </a:rPr>
-              <a:t>Ignored tips</a:t>
-            </a:r>
-          </a:p>
-          <a:p>
-            <a:pPr marL="800100" lvl="1" indent="-342900" algn="l">
-              <a:buFont typeface="Arial" panose="020B0604020202020204" pitchFamily="34" charset="0"/>
-              <a:buChar char="•"/>
-            </a:pPr>
-            <a:r>
-              <a:rPr lang="en-US" dirty="0">
-                <a:solidFill>
-                  <a:schemeClr val="bg1"/>
-                </a:solidFill>
-              </a:rPr>
-              <a:t>From &gt;79,000 businesses with disparate amounts of data to ~3000 complete</a:t>
+        <p:style>
+          <a:lnRef idx="2">
+            <a:schemeClr val="dk1"/>
+          </a:lnRef>
+          <a:fillRef idx="1">
+            <a:schemeClr val="lt1"/>
+          </a:fillRef>
+          <a:effectRef idx="0">
+            <a:schemeClr val="dk1"/>
+          </a:effectRef>
+          <a:fontRef idx="minor">
+            <a:schemeClr val="dk1"/>
+          </a:fontRef>
+        </p:style>
+        <p:txBody>
+          <a:bodyPr rtlCol="0" anchor="ctr"/>
+          <a:lstStyle/>
+          <a:p>
+            <a:pPr algn="ctr"/>
+            <a:r>
+              <a:rPr lang="en-US" dirty="0">
+                <a:solidFill>
+                  <a:schemeClr val="tx1"/>
+                </a:solidFill>
+              </a:rPr>
+              <a:t>Yelp Data</a:t>
+            </a:r>
+          </a:p>
+        </p:txBody>
+      </p:sp>
+      <p:sp>
+        <p:nvSpPr>
+          <p:cNvPr id="8" name="Rectangle 7"/>
+          <p:cNvSpPr/>
+          <p:nvPr/>
+        </p:nvSpPr>
+        <p:spPr>
+          <a:xfrm>
+            <a:off x="5569401" y="5990405"/>
+            <a:ext cx="1053193" cy="391886"/>
+          </a:xfrm>
+          <a:prstGeom prst="rect">
+            <a:avLst/>
+          </a:prstGeom>
+        </p:spPr>
+        <p:style>
+          <a:lnRef idx="2">
+            <a:schemeClr val="dk1"/>
+          </a:lnRef>
+          <a:fillRef idx="1">
+            <a:schemeClr val="lt1"/>
+          </a:fillRef>
+          <a:effectRef idx="0">
+            <a:schemeClr val="dk1"/>
+          </a:effectRef>
+          <a:fontRef idx="minor">
+            <a:schemeClr val="dk1"/>
+          </a:fontRef>
+        </p:style>
+        <p:txBody>
+          <a:bodyPr rtlCol="0" anchor="ctr"/>
+          <a:lstStyle/>
+          <a:p>
+            <a:pPr algn="ctr"/>
+            <a:r>
+              <a:rPr lang="en-US" dirty="0">
+                <a:solidFill>
+                  <a:schemeClr val="tx1"/>
+                </a:solidFill>
+              </a:rPr>
+              <a:t>System</a:t>
+            </a:r>
+          </a:p>
+        </p:txBody>
+      </p:sp>
+      <p:sp>
+        <p:nvSpPr>
+          <p:cNvPr id="9" name="Snip Same Side Corner Rectangle 8"/>
+          <p:cNvSpPr/>
+          <p:nvPr/>
+        </p:nvSpPr>
+        <p:spPr>
+          <a:xfrm rot="10800000">
+            <a:off x="5501638" y="1924594"/>
+            <a:ext cx="1188721" cy="561703"/>
+          </a:xfrm>
+          <a:prstGeom prst="snip2SameRect">
+            <a:avLst/>
+          </a:prstGeom>
+        </p:spPr>
+        <p:style>
+          <a:lnRef idx="2">
+            <a:schemeClr val="dk1"/>
+          </a:lnRef>
+          <a:fillRef idx="1">
+            <a:schemeClr val="lt1"/>
+          </a:fillRef>
+          <a:effectRef idx="0">
+            <a:schemeClr val="dk1"/>
+          </a:effectRef>
+          <a:fontRef idx="minor">
+            <a:schemeClr val="dk1"/>
+          </a:fontRef>
+        </p:style>
+        <p:txBody>
+          <a:bodyPr vert="horz" rtlCol="0" anchor="ctr">
+            <a:scene3d>
+              <a:camera prst="orthographicFront">
+                <a:rot lat="0" lon="0" rev="10799999"/>
+              </a:camera>
+              <a:lightRig rig="threePt" dir="t"/>
+            </a:scene3d>
+          </a:bodyPr>
+          <a:lstStyle/>
+          <a:p>
+            <a:pPr algn="ctr"/>
+            <a:r>
+              <a:rPr lang="en-US" dirty="0"/>
+              <a:t>Trimming</a:t>
+            </a:r>
+          </a:p>
+        </p:txBody>
+      </p:sp>
+      <p:cxnSp>
+        <p:nvCxnSpPr>
+          <p:cNvPr id="11" name="Straight Arrow Connector 10"/>
+          <p:cNvCxnSpPr>
+            <a:stCxn id="7" idx="2"/>
+            <a:endCxn id="9" idx="1"/>
+          </p:cNvCxnSpPr>
+          <p:nvPr/>
+        </p:nvCxnSpPr>
+        <p:spPr>
+          <a:xfrm flipH="1">
+            <a:off x="6095998" y="1672046"/>
+            <a:ext cx="2" cy="252548"/>
+          </a:xfrm>
+          <a:prstGeom prst="straightConnector1">
+            <a:avLst/>
+          </a:prstGeom>
+          <a:ln w="25400">
+            <a:solidFill>
+              <a:schemeClr val="bg1"/>
+            </a:solidFill>
+            <a:tailEnd type="triangle"/>
+          </a:ln>
+        </p:spPr>
+        <p:style>
+          <a:lnRef idx="1">
+            <a:schemeClr val="accent1"/>
+          </a:lnRef>
+          <a:fillRef idx="0">
+            <a:schemeClr val="accent1"/>
+          </a:fillRef>
+          <a:effectRef idx="0">
+            <a:schemeClr val="accent1"/>
+          </a:effectRef>
+          <a:fontRef idx="minor">
+            <a:schemeClr val="tx1"/>
+          </a:fontRef>
+        </p:style>
+      </p:cxnSp>
+      <p:sp>
+        <p:nvSpPr>
+          <p:cNvPr id="12" name="Snip Same Side Corner Rectangle 11"/>
+          <p:cNvSpPr/>
+          <p:nvPr/>
+        </p:nvSpPr>
+        <p:spPr>
+          <a:xfrm rot="10800000">
+            <a:off x="4102138" y="3787138"/>
+            <a:ext cx="1373780" cy="561703"/>
+          </a:xfrm>
+          <a:prstGeom prst="snip2SameRect">
+            <a:avLst/>
+          </a:prstGeom>
+        </p:spPr>
+        <p:style>
+          <a:lnRef idx="2">
+            <a:schemeClr val="dk1"/>
+          </a:lnRef>
+          <a:fillRef idx="1">
+            <a:schemeClr val="lt1"/>
+          </a:fillRef>
+          <a:effectRef idx="0">
+            <a:schemeClr val="dk1"/>
+          </a:effectRef>
+          <a:fontRef idx="minor">
+            <a:schemeClr val="dk1"/>
+          </a:fontRef>
+        </p:style>
+        <p:txBody>
+          <a:bodyPr vert="horz" rtlCol="0" anchor="ctr">
+            <a:scene3d>
+              <a:camera prst="orthographicFront">
+                <a:rot lat="0" lon="0" rev="10799999"/>
+              </a:camera>
+              <a:lightRig rig="threePt" dir="t"/>
+            </a:scene3d>
+          </a:bodyPr>
+          <a:lstStyle/>
+          <a:p>
+            <a:pPr algn="ctr"/>
+            <a:r>
+              <a:rPr lang="en-US" dirty="0"/>
+              <a:t>Feature Extraction</a:t>
+            </a:r>
+          </a:p>
+        </p:txBody>
+      </p:sp>
+      <p:sp>
+        <p:nvSpPr>
+          <p:cNvPr id="13" name="Snip Same Side Corner Rectangle 12"/>
+          <p:cNvSpPr/>
+          <p:nvPr/>
+        </p:nvSpPr>
+        <p:spPr>
+          <a:xfrm rot="10800000">
+            <a:off x="5475918" y="2738844"/>
+            <a:ext cx="1240160" cy="561703"/>
+          </a:xfrm>
+          <a:prstGeom prst="snip2SameRect">
+            <a:avLst/>
+          </a:prstGeom>
+        </p:spPr>
+        <p:style>
+          <a:lnRef idx="2">
+            <a:schemeClr val="dk1"/>
+          </a:lnRef>
+          <a:fillRef idx="1">
+            <a:schemeClr val="lt1"/>
+          </a:fillRef>
+          <a:effectRef idx="0">
+            <a:schemeClr val="dk1"/>
+          </a:effectRef>
+          <a:fontRef idx="minor">
+            <a:schemeClr val="dk1"/>
+          </a:fontRef>
+        </p:style>
+        <p:txBody>
+          <a:bodyPr vert="horz" rtlCol="0" anchor="ctr">
+            <a:scene3d>
+              <a:camera prst="orthographicFront">
+                <a:rot lat="0" lon="0" rev="10799999"/>
+              </a:camera>
+              <a:lightRig rig="threePt" dir="t"/>
+            </a:scene3d>
+          </a:bodyPr>
+          <a:lstStyle/>
+          <a:p>
+            <a:pPr algn="ctr"/>
+            <a:r>
+              <a:rPr lang="en-US" dirty="0"/>
+              <a:t>Basic Parsing</a:t>
+            </a:r>
+          </a:p>
+        </p:txBody>
+      </p:sp>
+      <p:cxnSp>
+        <p:nvCxnSpPr>
+          <p:cNvPr id="14" name="Straight Arrow Connector 13"/>
+          <p:cNvCxnSpPr>
+            <a:stCxn id="9" idx="3"/>
+            <a:endCxn id="13" idx="1"/>
+          </p:cNvCxnSpPr>
+          <p:nvPr/>
+        </p:nvCxnSpPr>
+        <p:spPr>
+          <a:xfrm>
+            <a:off x="6095998" y="2486297"/>
+            <a:ext cx="0" cy="252547"/>
+          </a:xfrm>
+          <a:prstGeom prst="straightConnector1">
+            <a:avLst/>
+          </a:prstGeom>
+          <a:ln w="25400">
+            <a:solidFill>
+              <a:schemeClr val="bg1"/>
+            </a:solidFill>
+            <a:tailEnd type="triangle"/>
+          </a:ln>
+        </p:spPr>
+        <p:style>
+          <a:lnRef idx="1">
+            <a:schemeClr val="accent1"/>
+          </a:lnRef>
+          <a:fillRef idx="0">
+            <a:schemeClr val="accent1"/>
+          </a:fillRef>
+          <a:effectRef idx="0">
+            <a:schemeClr val="accent1"/>
+          </a:effectRef>
+          <a:fontRef idx="minor">
+            <a:schemeClr val="tx1"/>
+          </a:fontRef>
+        </p:style>
+      </p:cxnSp>
+      <p:sp>
+        <p:nvSpPr>
+          <p:cNvPr id="18" name="Snip Same Side Corner Rectangle 17"/>
+          <p:cNvSpPr/>
+          <p:nvPr/>
+        </p:nvSpPr>
+        <p:spPr>
+          <a:xfrm rot="10800000">
+            <a:off x="6716078" y="3787138"/>
+            <a:ext cx="1373780" cy="561703"/>
+          </a:xfrm>
+          <a:prstGeom prst="snip2SameRect">
+            <a:avLst/>
+          </a:prstGeom>
+        </p:spPr>
+        <p:style>
+          <a:lnRef idx="2">
+            <a:schemeClr val="dk1"/>
+          </a:lnRef>
+          <a:fillRef idx="1">
+            <a:schemeClr val="lt1"/>
+          </a:fillRef>
+          <a:effectRef idx="0">
+            <a:schemeClr val="dk1"/>
+          </a:effectRef>
+          <a:fontRef idx="minor">
+            <a:schemeClr val="dk1"/>
+          </a:fontRef>
+        </p:style>
+        <p:txBody>
+          <a:bodyPr vert="horz" rtlCol="0" anchor="ctr">
+            <a:scene3d>
+              <a:camera prst="orthographicFront">
+                <a:rot lat="0" lon="0" rev="10799999"/>
+              </a:camera>
+              <a:lightRig rig="threePt" dir="t"/>
+            </a:scene3d>
+          </a:bodyPr>
+          <a:lstStyle/>
+          <a:p>
+            <a:pPr algn="ctr"/>
+            <a:r>
+              <a:rPr lang="en-US" dirty="0"/>
+              <a:t>Sentiment</a:t>
+            </a:r>
+          </a:p>
+        </p:txBody>
+      </p:sp>
+      <p:sp>
+        <p:nvSpPr>
+          <p:cNvPr id="19" name="Snip Same Side Corner Rectangle 18"/>
+          <p:cNvSpPr/>
+          <p:nvPr/>
+        </p:nvSpPr>
+        <p:spPr>
+          <a:xfrm rot="10800000">
+            <a:off x="6716077" y="4554576"/>
+            <a:ext cx="1373780" cy="561703"/>
+          </a:xfrm>
+          <a:prstGeom prst="snip2SameRect">
+            <a:avLst/>
+          </a:prstGeom>
+        </p:spPr>
+        <p:style>
+          <a:lnRef idx="2">
+            <a:schemeClr val="dk1"/>
+          </a:lnRef>
+          <a:fillRef idx="1">
+            <a:schemeClr val="lt1"/>
+          </a:fillRef>
+          <a:effectRef idx="0">
+            <a:schemeClr val="dk1"/>
+          </a:effectRef>
+          <a:fontRef idx="minor">
+            <a:schemeClr val="dk1"/>
+          </a:fontRef>
+        </p:style>
+        <p:txBody>
+          <a:bodyPr vert="horz" rtlCol="0" anchor="ctr">
+            <a:scene3d>
+              <a:camera prst="orthographicFront">
+                <a:rot lat="0" lon="0" rev="10799999"/>
+              </a:camera>
+              <a:lightRig rig="threePt" dir="t"/>
+            </a:scene3d>
+          </a:bodyPr>
+          <a:lstStyle/>
+          <a:p>
+            <a:pPr algn="ctr"/>
+            <a:r>
+              <a:rPr lang="en-US" dirty="0"/>
+              <a:t>Normalize</a:t>
+            </a:r>
+          </a:p>
+        </p:txBody>
+      </p:sp>
+      <p:cxnSp>
+        <p:nvCxnSpPr>
+          <p:cNvPr id="20" name="Straight Arrow Connector 19"/>
+          <p:cNvCxnSpPr>
+            <a:stCxn id="13" idx="3"/>
+            <a:endCxn id="12" idx="1"/>
+          </p:cNvCxnSpPr>
+          <p:nvPr/>
+        </p:nvCxnSpPr>
+        <p:spPr>
+          <a:xfrm flipH="1">
+            <a:off x="4789028" y="3300547"/>
+            <a:ext cx="1306970" cy="486591"/>
+          </a:xfrm>
+          <a:prstGeom prst="straightConnector1">
+            <a:avLst/>
+          </a:prstGeom>
+          <a:ln w="25400">
+            <a:solidFill>
+              <a:schemeClr val="bg1"/>
+            </a:solidFill>
+            <a:tailEnd type="triangle"/>
+          </a:ln>
+        </p:spPr>
+        <p:style>
+          <a:lnRef idx="1">
+            <a:schemeClr val="accent1"/>
+          </a:lnRef>
+          <a:fillRef idx="0">
+            <a:schemeClr val="accent1"/>
+          </a:fillRef>
+          <a:effectRef idx="0">
+            <a:schemeClr val="accent1"/>
+          </a:effectRef>
+          <a:fontRef idx="minor">
+            <a:schemeClr val="tx1"/>
+          </a:fontRef>
+        </p:style>
+      </p:cxnSp>
+      <p:cxnSp>
+        <p:nvCxnSpPr>
+          <p:cNvPr id="23" name="Straight Arrow Connector 22"/>
+          <p:cNvCxnSpPr>
+            <a:stCxn id="13" idx="3"/>
+            <a:endCxn id="18" idx="1"/>
+          </p:cNvCxnSpPr>
+          <p:nvPr/>
+        </p:nvCxnSpPr>
+        <p:spPr>
+          <a:xfrm>
+            <a:off x="6095998" y="3300547"/>
+            <a:ext cx="1306970" cy="486591"/>
+          </a:xfrm>
+          <a:prstGeom prst="straightConnector1">
+            <a:avLst/>
+          </a:prstGeom>
+          <a:ln w="25400">
+            <a:solidFill>
+              <a:schemeClr val="bg1"/>
+            </a:solidFill>
+            <a:tailEnd type="triangle"/>
+          </a:ln>
+        </p:spPr>
+        <p:style>
+          <a:lnRef idx="1">
+            <a:schemeClr val="accent1"/>
+          </a:lnRef>
+          <a:fillRef idx="0">
+            <a:schemeClr val="accent1"/>
+          </a:fillRef>
+          <a:effectRef idx="0">
+            <a:schemeClr val="accent1"/>
+          </a:effectRef>
+          <a:fontRef idx="minor">
+            <a:schemeClr val="tx1"/>
+          </a:fontRef>
+        </p:style>
+      </p:cxnSp>
+      <p:cxnSp>
+        <p:nvCxnSpPr>
+          <p:cNvPr id="26" name="Straight Arrow Connector 25"/>
+          <p:cNvCxnSpPr>
+            <a:stCxn id="18" idx="3"/>
+            <a:endCxn id="19" idx="1"/>
+          </p:cNvCxnSpPr>
+          <p:nvPr/>
+        </p:nvCxnSpPr>
+        <p:spPr>
+          <a:xfrm flipH="1">
+            <a:off x="7402967" y="4348841"/>
+            <a:ext cx="1" cy="205735"/>
+          </a:xfrm>
+          <a:prstGeom prst="straightConnector1">
+            <a:avLst/>
+          </a:prstGeom>
+          <a:ln w="25400">
+            <a:solidFill>
+              <a:schemeClr val="bg1"/>
+            </a:solidFill>
+            <a:tailEnd type="triangle"/>
+          </a:ln>
+        </p:spPr>
+        <p:style>
+          <a:lnRef idx="1">
+            <a:schemeClr val="accent1"/>
+          </a:lnRef>
+          <a:fillRef idx="0">
+            <a:schemeClr val="accent1"/>
+          </a:fillRef>
+          <a:effectRef idx="0">
+            <a:schemeClr val="accent1"/>
+          </a:effectRef>
+          <a:fontRef idx="minor">
+            <a:schemeClr val="tx1"/>
+          </a:fontRef>
+        </p:style>
+      </p:cxnSp>
+      <p:sp>
+        <p:nvSpPr>
+          <p:cNvPr id="31" name="Snip Same Side Corner Rectangle 30"/>
+          <p:cNvSpPr/>
+          <p:nvPr/>
+        </p:nvSpPr>
+        <p:spPr>
+          <a:xfrm rot="5400000">
+            <a:off x="3677596" y="5675465"/>
+            <a:ext cx="849081" cy="1021766"/>
+          </a:xfrm>
+          <a:prstGeom prst="snip2SameRect">
+            <a:avLst/>
+          </a:prstGeom>
+        </p:spPr>
+        <p:style>
+          <a:lnRef idx="2">
+            <a:schemeClr val="dk1"/>
+          </a:lnRef>
+          <a:fillRef idx="1">
+            <a:schemeClr val="lt1"/>
+          </a:fillRef>
+          <a:effectRef idx="0">
+            <a:schemeClr val="dk1"/>
+          </a:effectRef>
+          <a:fontRef idx="minor">
+            <a:schemeClr val="dk1"/>
+          </a:fontRef>
+        </p:style>
+        <p:txBody>
+          <a:bodyPr vert="horz" rtlCol="0" anchor="ctr">
+            <a:scene3d>
+              <a:camera prst="orthographicFront">
+                <a:rot lat="0" lon="0" rev="5400000"/>
+              </a:camera>
+              <a:lightRig rig="threePt" dir="t"/>
+            </a:scene3d>
+          </a:bodyPr>
+          <a:lstStyle/>
+          <a:p>
+            <a:pPr algn="ctr"/>
+            <a:r>
+              <a:rPr lang="en-US" dirty="0"/>
+              <a:t>Input</a:t>
+            </a:r>
+          </a:p>
+        </p:txBody>
+      </p:sp>
+      <p:cxnSp>
+        <p:nvCxnSpPr>
+          <p:cNvPr id="32" name="Straight Arrow Connector 31"/>
+          <p:cNvCxnSpPr>
+            <a:stCxn id="12" idx="3"/>
+            <a:endCxn id="8" idx="0"/>
+          </p:cNvCxnSpPr>
+          <p:nvPr/>
+        </p:nvCxnSpPr>
+        <p:spPr>
+          <a:xfrm>
+            <a:off x="4789028" y="4348841"/>
+            <a:ext cx="1306970" cy="1641564"/>
+          </a:xfrm>
+          <a:prstGeom prst="straightConnector1">
+            <a:avLst/>
+          </a:prstGeom>
+          <a:ln w="25400">
+            <a:solidFill>
+              <a:schemeClr val="bg1"/>
+            </a:solidFill>
+            <a:tailEnd type="triangle"/>
+          </a:ln>
+        </p:spPr>
+        <p:style>
+          <a:lnRef idx="1">
+            <a:schemeClr val="accent1"/>
+          </a:lnRef>
+          <a:fillRef idx="0">
+            <a:schemeClr val="accent1"/>
+          </a:fillRef>
+          <a:effectRef idx="0">
+            <a:schemeClr val="accent1"/>
+          </a:effectRef>
+          <a:fontRef idx="minor">
+            <a:schemeClr val="tx1"/>
+          </a:fontRef>
+        </p:style>
+      </p:cxnSp>
+      <p:cxnSp>
+        <p:nvCxnSpPr>
+          <p:cNvPr id="35" name="Straight Arrow Connector 34"/>
+          <p:cNvCxnSpPr>
+            <a:stCxn id="19" idx="3"/>
+            <a:endCxn id="8" idx="0"/>
+          </p:cNvCxnSpPr>
+          <p:nvPr/>
+        </p:nvCxnSpPr>
+        <p:spPr>
+          <a:xfrm flipH="1">
+            <a:off x="6095998" y="5116279"/>
+            <a:ext cx="1306969" cy="874126"/>
+          </a:xfrm>
+          <a:prstGeom prst="straightConnector1">
+            <a:avLst/>
+          </a:prstGeom>
+          <a:ln w="25400">
+            <a:solidFill>
+              <a:schemeClr val="bg1"/>
+            </a:solidFill>
+            <a:tailEnd type="triangle"/>
+          </a:ln>
+        </p:spPr>
+        <p:style>
+          <a:lnRef idx="1">
+            <a:schemeClr val="accent1"/>
+          </a:lnRef>
+          <a:fillRef idx="0">
+            <a:schemeClr val="accent1"/>
+          </a:fillRef>
+          <a:effectRef idx="0">
+            <a:schemeClr val="accent1"/>
+          </a:effectRef>
+          <a:fontRef idx="minor">
+            <a:schemeClr val="tx1"/>
+          </a:fontRef>
+        </p:style>
+      </p:cxnSp>
+      <p:cxnSp>
+        <p:nvCxnSpPr>
+          <p:cNvPr id="38" name="Straight Arrow Connector 37"/>
+          <p:cNvCxnSpPr>
+            <a:stCxn id="31" idx="3"/>
+            <a:endCxn id="8" idx="1"/>
+          </p:cNvCxnSpPr>
+          <p:nvPr/>
+        </p:nvCxnSpPr>
+        <p:spPr>
+          <a:xfrm flipV="1">
+            <a:off x="4613020" y="6186348"/>
+            <a:ext cx="956381" cy="1"/>
+          </a:xfrm>
+          <a:prstGeom prst="straightConnector1">
+            <a:avLst/>
+          </a:prstGeom>
+          <a:ln w="25400">
+            <a:solidFill>
+              <a:schemeClr val="bg1"/>
+            </a:solidFill>
+            <a:tailEnd type="triangle"/>
+          </a:ln>
+        </p:spPr>
+        <p:style>
+          <a:lnRef idx="1">
+            <a:schemeClr val="accent1"/>
+          </a:lnRef>
+          <a:fillRef idx="0">
+            <a:schemeClr val="accent1"/>
+          </a:fillRef>
+          <a:effectRef idx="0">
+            <a:schemeClr val="accent1"/>
+          </a:effectRef>
+          <a:fontRef idx="minor">
+            <a:schemeClr val="tx1"/>
+          </a:fontRef>
+        </p:style>
+      </p:cxnSp>
+      <p:cxnSp>
+        <p:nvCxnSpPr>
+          <p:cNvPr id="41" name="Straight Arrow Connector 40"/>
+          <p:cNvCxnSpPr>
+            <a:stCxn id="8" idx="3"/>
+            <a:endCxn id="53" idx="1"/>
+          </p:cNvCxnSpPr>
+          <p:nvPr/>
+        </p:nvCxnSpPr>
+        <p:spPr>
+          <a:xfrm>
+            <a:off x="6622594" y="6186348"/>
+            <a:ext cx="1467263" cy="0"/>
+          </a:xfrm>
+          <a:prstGeom prst="straightConnector1">
+            <a:avLst/>
+          </a:prstGeom>
+          <a:ln w="25400">
+            <a:solidFill>
+              <a:schemeClr val="bg1"/>
+            </a:solidFill>
+            <a:tailEnd type="triangle"/>
+          </a:ln>
+        </p:spPr>
+        <p:style>
+          <a:lnRef idx="1">
+            <a:schemeClr val="accent1"/>
+          </a:lnRef>
+          <a:fillRef idx="0">
+            <a:schemeClr val="accent1"/>
+          </a:fillRef>
+          <a:effectRef idx="0">
+            <a:schemeClr val="accent1"/>
+          </a:effectRef>
+          <a:fontRef idx="minor">
+            <a:schemeClr val="tx1"/>
+          </a:fontRef>
+        </p:style>
+      </p:cxnSp>
+      <p:cxnSp>
+        <p:nvCxnSpPr>
+          <p:cNvPr id="48" name="Elbow Connector 47"/>
+          <p:cNvCxnSpPr>
+            <a:stCxn id="12" idx="3"/>
+          </p:cNvCxnSpPr>
+          <p:nvPr/>
+        </p:nvCxnSpPr>
+        <p:spPr>
+          <a:xfrm rot="5400000">
+            <a:off x="3721212" y="3762715"/>
+            <a:ext cx="481690" cy="1653942"/>
+          </a:xfrm>
+          <a:prstGeom prst="bentConnector2">
+            <a:avLst/>
+          </a:prstGeom>
+          <a:ln w="25400">
+            <a:solidFill>
+              <a:schemeClr val="bg1"/>
+            </a:solidFill>
+          </a:ln>
+        </p:spPr>
+        <p:style>
+          <a:lnRef idx="1">
+            <a:schemeClr val="accent1"/>
+          </a:lnRef>
+          <a:fillRef idx="0">
+            <a:schemeClr val="accent1"/>
+          </a:fillRef>
+          <a:effectRef idx="0">
+            <a:schemeClr val="accent1"/>
+          </a:effectRef>
+          <a:fontRef idx="minor">
+            <a:schemeClr val="tx1"/>
+          </a:fontRef>
+        </p:style>
+      </p:cxnSp>
+      <p:cxnSp>
+        <p:nvCxnSpPr>
+          <p:cNvPr id="51" name="Elbow Connector 50"/>
+          <p:cNvCxnSpPr>
+            <a:endCxn id="31" idx="1"/>
+          </p:cNvCxnSpPr>
+          <p:nvPr/>
+        </p:nvCxnSpPr>
+        <p:spPr>
+          <a:xfrm rot="16200000" flipH="1">
+            <a:off x="2681178" y="5276272"/>
+            <a:ext cx="1350921" cy="469231"/>
+          </a:xfrm>
+          <a:prstGeom prst="bentConnector2">
+            <a:avLst/>
+          </a:prstGeom>
+          <a:ln w="25400">
+            <a:solidFill>
+              <a:schemeClr val="bg1"/>
+            </a:solidFill>
+            <a:tailEnd type="triangle"/>
+          </a:ln>
+        </p:spPr>
+        <p:style>
+          <a:lnRef idx="1">
+            <a:schemeClr val="accent1"/>
+          </a:lnRef>
+          <a:fillRef idx="0">
+            <a:schemeClr val="accent1"/>
+          </a:fillRef>
+          <a:effectRef idx="0">
+            <a:schemeClr val="accent1"/>
+          </a:effectRef>
+          <a:fontRef idx="minor">
+            <a:schemeClr val="tx1"/>
+          </a:fontRef>
+        </p:style>
+      </p:cxnSp>
+      <p:sp>
+        <p:nvSpPr>
+          <p:cNvPr id="53" name="Rectangle 52"/>
+          <p:cNvSpPr/>
+          <p:nvPr/>
+        </p:nvSpPr>
+        <p:spPr>
+          <a:xfrm>
+            <a:off x="8089857" y="5906040"/>
+            <a:ext cx="1053193" cy="560616"/>
+          </a:xfrm>
+          <a:prstGeom prst="rect">
+            <a:avLst/>
+          </a:prstGeom>
+        </p:spPr>
+        <p:style>
+          <a:lnRef idx="2">
+            <a:schemeClr val="dk1"/>
+          </a:lnRef>
+          <a:fillRef idx="1">
+            <a:schemeClr val="lt1"/>
+          </a:fillRef>
+          <a:effectRef idx="0">
+            <a:schemeClr val="dk1"/>
+          </a:effectRef>
+          <a:fontRef idx="minor">
+            <a:schemeClr val="dk1"/>
+          </a:fontRef>
+        </p:style>
+        <p:txBody>
+          <a:bodyPr rtlCol="0" anchor="ctr"/>
+          <a:lstStyle/>
+          <a:p>
+            <a:pPr algn="ctr"/>
+            <a:r>
+              <a:rPr lang="en-US" dirty="0">
+                <a:solidFill>
+                  <a:schemeClr val="tx1"/>
+                </a:solidFill>
+              </a:rPr>
+              <a:t>Expected Rating</a:t>
             </a:r>
           </a:p>
         </p:txBody>
@@ -3570,7 +4290,7 @@
     </p:spTree>
     <p:extLst>
       <p:ext uri="{BB962C8B-B14F-4D97-AF65-F5344CB8AC3E}">
-        <p14:creationId xmlns:p14="http://schemas.microsoft.com/office/powerpoint/2010/main" val="3383226353"/>
+        <p14:creationId xmlns:p14="http://schemas.microsoft.com/office/powerpoint/2010/main" val="282099222"/>
       </p:ext>
     </p:extLst>
   </p:cSld>
@@ -3657,7 +4377,7 @@
                   <a:schemeClr val="bg1"/>
                 </a:solidFill>
               </a:rPr>
-              <a:t>Approach-Preprocessing</a:t>
+              <a:t>Approach-Choosing the Data</a:t>
             </a:r>
           </a:p>
         </p:txBody>
@@ -3679,9 +4399,7 @@
           </a:xfrm>
         </p:spPr>
         <p:txBody>
-          <a:bodyPr>
-            <a:normAutofit fontScale="92500" lnSpcReduction="10000"/>
-          </a:bodyPr>
+          <a:bodyPr/>
           <a:lstStyle/>
           <a:p>
             <a:pPr marL="342900" indent="-342900" algn="l">
@@ -3694,7 +4412,21 @@
                   <a:schemeClr val="bg1"/>
                 </a:solidFill>
               </a:rPr>
-              <a:t>Setting the system up for success</a:t>
+              <a:t>Millions of reviews, only so much processing power</a:t>
+            </a:r>
+          </a:p>
+          <a:p>
+            <a:pPr marL="342900" indent="-342900" algn="l">
+              <a:buFont typeface="Arial" panose="020B0604020202020204" pitchFamily="34" charset="0"/>
+              <a:buChar char="•"/>
+            </a:pPr>
+            <a:r>
+              <a:rPr lang="en-US" dirty="0">
+                <a:solidFill>
+                  <a:schemeClr val="bg1"/>
+                </a:solidFill>
+              </a:rPr>
+              <a:t>Limiting problem space let’s us get more focused data</a:t>
             </a:r>
           </a:p>
           <a:p>
@@ -3719,7 +4451,7 @@
                   <a:schemeClr val="bg1"/>
                 </a:solidFill>
               </a:rPr>
-              <a:t>Basic</a:t>
+              <a:t>Reduction</a:t>
             </a:r>
           </a:p>
           <a:p>
@@ -3733,7 +4465,7 @@
                   <a:schemeClr val="bg1"/>
                 </a:solidFill>
               </a:rPr>
-              <a:t>Converted to CSV files for easy use by all group members and languages</a:t>
+              <a:t>Only businesses in Pittsburgh</a:t>
             </a:r>
           </a:p>
           <a:p>
@@ -3747,7 +4479,7 @@
                   <a:schemeClr val="bg1"/>
                 </a:solidFill>
               </a:rPr>
-              <a:t>End-of-Sentence parser for reviews</a:t>
+              <a:t>Removed several fields (check-ins, for instance)</a:t>
             </a:r>
           </a:p>
           <a:p>
@@ -3761,7 +4493,7 @@
                   <a:schemeClr val="bg1"/>
                 </a:solidFill>
               </a:rPr>
-              <a:t>Sentence tokenization</a:t>
+              <a:t>Ignored tips</a:t>
             </a:r>
           </a:p>
           <a:p>
@@ -3775,96 +4507,15 @@
                   <a:schemeClr val="bg1"/>
                 </a:solidFill>
               </a:rPr>
-              <a:t>Manually redoing neighborhoods with Geocoder and Zillow</a:t>
-            </a:r>
-          </a:p>
-          <a:p>
-            <a:pPr marL="342900" indent="-342900" algn="l">
-              <a:buFont typeface="Arial" panose="020B0604020202020204" pitchFamily="34" charset="0"/>
-              <a:buChar char="•"/>
-            </a:pPr>
-            <a:r>
-              <a:rPr lang="en-US" dirty="0">
-                <a:solidFill>
-                  <a:schemeClr val="bg1"/>
-                </a:solidFill>
-              </a:rPr>
-              <a:t>Task-specific</a:t>
-            </a:r>
-          </a:p>
-          <a:p>
-            <a:pPr marL="800100" lvl="1" indent="-342900" algn="l">
-              <a:buFont typeface="Arial" panose="020B0604020202020204" pitchFamily="34" charset="0"/>
-              <a:buChar char="•"/>
-            </a:pPr>
-            <a:r>
-              <a:rPr lang="en-US" dirty="0">
-                <a:solidFill>
-                  <a:schemeClr val="bg1"/>
-                </a:solidFill>
-              </a:rPr>
-              <a:t>Feature extraction</a:t>
-            </a:r>
-          </a:p>
-          <a:p>
-            <a:pPr marL="1257300" lvl="2" indent="-342900" algn="l">
-              <a:buFont typeface="Arial" panose="020B0604020202020204" pitchFamily="34" charset="0"/>
-              <a:buChar char="•"/>
-            </a:pPr>
-            <a:r>
-              <a:rPr lang="en-US" dirty="0">
-                <a:solidFill>
-                  <a:schemeClr val="bg1"/>
-                </a:solidFill>
-              </a:rPr>
-              <a:t>Part-of-speech tagging</a:t>
-            </a:r>
-          </a:p>
-          <a:p>
-            <a:pPr marL="1714500" lvl="3" indent="-342900" algn="l">
-              <a:buFont typeface="Arial" panose="020B0604020202020204" pitchFamily="34" charset="0"/>
-              <a:buChar char="•"/>
-            </a:pPr>
-            <a:r>
-              <a:rPr lang="en-US" dirty="0">
-                <a:solidFill>
-                  <a:schemeClr val="bg1"/>
-                </a:solidFill>
-              </a:rPr>
-              <a:t>Simplify</a:t>
-            </a:r>
-          </a:p>
-          <a:p>
-            <a:pPr marL="1257300" lvl="2" indent="-342900" algn="l">
-              <a:buFont typeface="Arial" panose="020B0604020202020204" pitchFamily="34" charset="0"/>
-              <a:buChar char="•"/>
-            </a:pPr>
-            <a:r>
-              <a:rPr lang="en-US" dirty="0">
-                <a:solidFill>
-                  <a:schemeClr val="bg1"/>
-                </a:solidFill>
-              </a:rPr>
-              <a:t>Match features by part-of-speech and position in grammar</a:t>
-            </a:r>
-          </a:p>
-          <a:p>
-            <a:pPr marL="1257300" lvl="2" indent="-342900" algn="l">
-              <a:buFont typeface="Arial" panose="020B0604020202020204" pitchFamily="34" charset="0"/>
-              <a:buChar char="•"/>
-            </a:pPr>
-            <a:endParaRPr lang="en-US" dirty="0">
-              <a:solidFill>
-                <a:schemeClr val="bg1"/>
-              </a:solidFill>
-            </a:endParaRPr>
+              <a:t>From &gt;79,000 businesses with disparate amounts of data to ~3000 complete</a:t>
+            </a:r>
           </a:p>
         </p:txBody>
       </p:sp>
     </p:spTree>
     <p:extLst>
       <p:ext uri="{BB962C8B-B14F-4D97-AF65-F5344CB8AC3E}">
-        <p14:creationId xmlns:p14="http://schemas.microsoft.com/office/powerpoint/2010/main" val="2134169407"/>
+        <p14:creationId xmlns:p14="http://schemas.microsoft.com/office/powerpoint/2010/main" val="3383226353"/>
       </p:ext>
     </p:extLst>
   </p:cSld>
@@ -3951,7 +4602,7 @@
                   <a:schemeClr val="bg1"/>
                 </a:solidFill>
               </a:rPr>
-              <a:t>Approach-Sentiment</a:t>
+              <a:t>Approach-Preprocessing</a:t>
             </a:r>
           </a:p>
         </p:txBody>
@@ -3973,7 +4624,9 @@
           </a:xfrm>
         </p:spPr>
         <p:txBody>
-          <a:bodyPr/>
+          <a:bodyPr>
+            <a:normAutofit fontScale="92500" lnSpcReduction="10000"/>
+          </a:bodyPr>
           <a:lstStyle/>
           <a:p>
             <a:pPr marL="342900" indent="-342900" algn="l">
@@ -3986,7 +4639,7 @@
                   <a:schemeClr val="bg1"/>
                 </a:solidFill>
               </a:rPr>
-              <a:t>Similar to feature extraction, what words would people use to describe businesses?</a:t>
+              <a:t>Setting the system up for success</a:t>
             </a:r>
           </a:p>
           <a:p>
@@ -4011,7 +4664,7 @@
                   <a:schemeClr val="bg1"/>
                 </a:solidFill>
               </a:rPr>
-              <a:t>Model?</a:t>
+              <a:t>Basic</a:t>
             </a:r>
           </a:p>
           <a:p>
@@ -4025,70 +4678,138 @@
                   <a:schemeClr val="bg1"/>
                 </a:solidFill>
               </a:rPr>
-              <a:t>Attempted Stanford </a:t>
-            </a:r>
-            <a:r>
-              <a:rPr lang="en-US" dirty="0" err="1">
-                <a:solidFill>
-                  <a:schemeClr val="bg1"/>
-                </a:solidFill>
-              </a:rPr>
-              <a:t>coreNLP</a:t>
-            </a:r>
+              <a:t>Converted to CSV files for easy use by all group members and languages</a:t>
+            </a:r>
+          </a:p>
+          <a:p>
+            <a:pPr marL="800100" lvl="1" indent="-342900" algn="l">
+              <a:buFont typeface="Arial" panose="020B0604020202020204" pitchFamily="34" charset="0"/>
+              <a:buChar char="•"/>
+            </a:pPr>
+            <a:r>
+              <a:rPr lang="en-US" dirty="0">
+                <a:solidFill>
+                  <a:schemeClr val="bg1"/>
+                </a:solidFill>
+              </a:rPr>
+              <a:t>End-of-Sentence parser for reviews</a:t>
+            </a:r>
+          </a:p>
+          <a:p>
+            <a:pPr marL="800100" lvl="1" indent="-342900" algn="l">
+              <a:buFont typeface="Arial" panose="020B0604020202020204" pitchFamily="34" charset="0"/>
+              <a:buChar char="•"/>
+            </a:pPr>
+            <a:r>
+              <a:rPr lang="en-US" dirty="0">
+                <a:solidFill>
+                  <a:schemeClr val="bg1"/>
+                </a:solidFill>
+              </a:rPr>
+              <a:t>Sentence tokenization</a:t>
+            </a:r>
+          </a:p>
+          <a:p>
+            <a:pPr marL="800100" lvl="1" indent="-342900" algn="l">
+              <a:buFont typeface="Arial" panose="020B0604020202020204" pitchFamily="34" charset="0"/>
+              <a:buChar char="•"/>
+            </a:pPr>
+            <a:r>
+              <a:rPr lang="en-US" dirty="0">
+                <a:solidFill>
+                  <a:schemeClr val="bg1"/>
+                </a:solidFill>
+              </a:rPr>
+              <a:t>Manually redoing neighborhoods with Geocoder and Zillow</a:t>
+            </a:r>
+          </a:p>
+          <a:p>
+            <a:pPr marL="342900" indent="-342900" algn="l">
+              <a:buFont typeface="Arial" panose="020B0604020202020204" pitchFamily="34" charset="0"/>
+              <a:buChar char="•"/>
+            </a:pPr>
+            <a:r>
+              <a:rPr lang="en-US" dirty="0">
+                <a:solidFill>
+                  <a:schemeClr val="bg1"/>
+                </a:solidFill>
+              </a:rPr>
+              <a:t>Task-specific</a:t>
+            </a:r>
+          </a:p>
+          <a:p>
+            <a:pPr marL="800100" lvl="1" indent="-342900" algn="l">
+              <a:buFont typeface="Arial" panose="020B0604020202020204" pitchFamily="34" charset="0"/>
+              <a:buChar char="•"/>
+            </a:pPr>
+            <a:r>
+              <a:rPr lang="en-US" dirty="0">
+                <a:solidFill>
+                  <a:schemeClr val="bg1"/>
+                </a:solidFill>
+              </a:rPr>
+              <a:t>Feature extraction</a:t>
+            </a:r>
+          </a:p>
+          <a:p>
+            <a:pPr marL="1257300" lvl="2" indent="-342900" algn="l">
+              <a:buFont typeface="Arial" panose="020B0604020202020204" pitchFamily="34" charset="0"/>
+              <a:buChar char="•"/>
+            </a:pPr>
+            <a:r>
+              <a:rPr lang="en-US" dirty="0">
+                <a:solidFill>
+                  <a:schemeClr val="bg1"/>
+                </a:solidFill>
+              </a:rPr>
+              <a:t>Part-of-speech tagging</a:t>
+            </a:r>
+          </a:p>
+          <a:p>
+            <a:pPr marL="1714500" lvl="3" indent="-342900" algn="l">
+              <a:buFont typeface="Arial" panose="020B0604020202020204" pitchFamily="34" charset="0"/>
+              <a:buChar char="•"/>
+            </a:pPr>
+            <a:r>
+              <a:rPr lang="en-US" dirty="0">
+                <a:solidFill>
+                  <a:schemeClr val="bg1"/>
+                </a:solidFill>
+              </a:rPr>
+              <a:t>Simplify</a:t>
+            </a:r>
+          </a:p>
+          <a:p>
+            <a:pPr marL="1257300" lvl="2" indent="-342900" algn="l">
+              <a:buFont typeface="Arial" panose="020B0604020202020204" pitchFamily="34" charset="0"/>
+              <a:buChar char="•"/>
+            </a:pPr>
+            <a:r>
+              <a:rPr lang="en-US" dirty="0">
+                <a:solidFill>
+                  <a:schemeClr val="bg1"/>
+                </a:solidFill>
+              </a:rPr>
+              <a:t>Match features by part-of-speech and position in grammar</a:t>
+            </a:r>
+          </a:p>
+          <a:p>
+            <a:pPr marL="1257300" lvl="2" indent="-342900" algn="l">
+              <a:buFont typeface="Arial" panose="020B0604020202020204" pitchFamily="34" charset="0"/>
+              <a:buChar char="•"/>
+            </a:pPr>
             <a:endParaRPr lang="en-US" dirty="0">
               <a:solidFill>
                 <a:schemeClr val="bg1"/>
               </a:solidFill>
             </a:endParaRPr>
           </a:p>
-          <a:p>
-            <a:pPr marL="800100" lvl="1" indent="-342900" algn="l">
-              <a:buFont typeface="Arial" panose="020B0604020202020204" pitchFamily="34" charset="0"/>
-              <a:buChar char="•"/>
-            </a:pPr>
-            <a:r>
-              <a:rPr lang="en-US" dirty="0">
-                <a:solidFill>
-                  <a:schemeClr val="bg1"/>
-                </a:solidFill>
-              </a:rPr>
-              <a:t>Settled on Naïve Bayes bag-of-bigrams</a:t>
-            </a:r>
-          </a:p>
-          <a:p>
-            <a:pPr marL="342900" indent="-342900" algn="l">
-              <a:buFont typeface="Arial" panose="020B0604020202020204" pitchFamily="34" charset="0"/>
-              <a:buChar char="•"/>
-            </a:pPr>
-            <a:r>
-              <a:rPr lang="en-US" dirty="0">
-                <a:solidFill>
-                  <a:schemeClr val="bg1"/>
-                </a:solidFill>
-              </a:rPr>
-              <a:t>Different users give different ratings for what might appear to be the same sentiment</a:t>
-            </a:r>
-          </a:p>
-          <a:p>
-            <a:pPr marL="800100" lvl="1" indent="-342900" algn="l">
-              <a:buFont typeface="Arial" panose="020B0604020202020204" pitchFamily="34" charset="0"/>
-              <a:buChar char="•"/>
-            </a:pPr>
-            <a:r>
-              <a:rPr lang="en-US" dirty="0">
-                <a:solidFill>
-                  <a:schemeClr val="bg1"/>
-                </a:solidFill>
-              </a:rPr>
-              <a:t>Normalize by user average rating</a:t>
-            </a:r>
-          </a:p>
         </p:txBody>
       </p:sp>
     </p:spTree>
     <p:extLst>
       <p:ext uri="{BB962C8B-B14F-4D97-AF65-F5344CB8AC3E}">
-        <p14:creationId xmlns:p14="http://schemas.microsoft.com/office/powerpoint/2010/main" val="4128094917"/>
+        <p14:creationId xmlns:p14="http://schemas.microsoft.com/office/powerpoint/2010/main" val="2134169407"/>
       </p:ext>
     </p:extLst>
   </p:cSld>
@@ -4175,6 +4896,230 @@
                   <a:schemeClr val="bg1"/>
                 </a:solidFill>
               </a:rPr>
+              <a:t>Approach-Sentiment</a:t>
+            </a:r>
+          </a:p>
+        </p:txBody>
+      </p:sp>
+      <p:sp>
+        <p:nvSpPr>
+          <p:cNvPr id="3" name="Subtitle 2"/>
+          <p:cNvSpPr>
+            <a:spLocks noGrp="1"/>
+          </p:cNvSpPr>
+          <p:nvPr>
+            <p:ph type="subTitle" idx="1"/>
+          </p:nvPr>
+        </p:nvSpPr>
+        <p:spPr>
+          <a:xfrm>
+            <a:off x="1524000" y="1227907"/>
+            <a:ext cx="9144000" cy="4029893"/>
+          </a:xfrm>
+        </p:spPr>
+        <p:txBody>
+          <a:bodyPr/>
+          <a:lstStyle/>
+          <a:p>
+            <a:pPr marL="342900" indent="-342900" algn="l">
+              <a:buFont typeface="Arial" panose="020B0604020202020204" pitchFamily="34" charset="0"/>
+              <a:buChar char="•"/>
+            </a:pPr>
+            <a:r>
+              <a:rPr lang="en-US" dirty="0">
+                <a:solidFill>
+                  <a:schemeClr val="bg1"/>
+                </a:solidFill>
+              </a:rPr>
+              <a:t>Similar to feature extraction, what words would people use to describe businesses?</a:t>
+            </a:r>
+          </a:p>
+          <a:p>
+            <a:pPr marL="342900" indent="-342900" algn="l">
+              <a:buFont typeface="Arial" panose="020B0604020202020204" pitchFamily="34" charset="0"/>
+              <a:buChar char="•"/>
+            </a:pPr>
+            <a:endParaRPr lang="en-US" dirty="0">
+              <a:solidFill>
+                <a:schemeClr val="bg1"/>
+              </a:solidFill>
+            </a:endParaRPr>
+          </a:p>
+          <a:p>
+            <a:pPr marL="342900" indent="-342900" algn="l">
+              <a:buFont typeface="Arial" panose="020B0604020202020204" pitchFamily="34" charset="0"/>
+              <a:buChar char="•"/>
+            </a:pPr>
+            <a:r>
+              <a:rPr lang="en-US" dirty="0">
+                <a:solidFill>
+                  <a:schemeClr val="bg1"/>
+                </a:solidFill>
+              </a:rPr>
+              <a:t>Model?</a:t>
+            </a:r>
+          </a:p>
+          <a:p>
+            <a:pPr marL="800100" lvl="1" indent="-342900" algn="l">
+              <a:buFont typeface="Arial" panose="020B0604020202020204" pitchFamily="34" charset="0"/>
+              <a:buChar char="•"/>
+            </a:pPr>
+            <a:r>
+              <a:rPr lang="en-US" dirty="0">
+                <a:solidFill>
+                  <a:schemeClr val="bg1"/>
+                </a:solidFill>
+              </a:rPr>
+              <a:t>Attempted Stanford </a:t>
+            </a:r>
+            <a:r>
+              <a:rPr lang="en-US" dirty="0" err="1">
+                <a:solidFill>
+                  <a:schemeClr val="bg1"/>
+                </a:solidFill>
+              </a:rPr>
+              <a:t>coreNLP</a:t>
+            </a:r>
+            <a:endParaRPr lang="en-US" dirty="0">
+              <a:solidFill>
+                <a:schemeClr val="bg1"/>
+              </a:solidFill>
+            </a:endParaRPr>
+          </a:p>
+          <a:p>
+            <a:pPr marL="800100" lvl="1" indent="-342900" algn="l">
+              <a:buFont typeface="Arial" panose="020B0604020202020204" pitchFamily="34" charset="0"/>
+              <a:buChar char="•"/>
+            </a:pPr>
+            <a:r>
+              <a:rPr lang="en-US" dirty="0">
+                <a:solidFill>
+                  <a:schemeClr val="bg1"/>
+                </a:solidFill>
+              </a:rPr>
+              <a:t>Settled on Naïve Bayes bag-of-bigrams</a:t>
+            </a:r>
+          </a:p>
+          <a:p>
+            <a:pPr marL="342900" indent="-342900" algn="l">
+              <a:buFont typeface="Arial" panose="020B0604020202020204" pitchFamily="34" charset="0"/>
+              <a:buChar char="•"/>
+            </a:pPr>
+            <a:r>
+              <a:rPr lang="en-US" dirty="0">
+                <a:solidFill>
+                  <a:schemeClr val="bg1"/>
+                </a:solidFill>
+              </a:rPr>
+              <a:t>Different users give different ratings for what might appear to be the same sentiment</a:t>
+            </a:r>
+          </a:p>
+          <a:p>
+            <a:pPr marL="800100" lvl="1" indent="-342900" algn="l">
+              <a:buFont typeface="Arial" panose="020B0604020202020204" pitchFamily="34" charset="0"/>
+              <a:buChar char="•"/>
+            </a:pPr>
+            <a:r>
+              <a:rPr lang="en-US" dirty="0">
+                <a:solidFill>
+                  <a:schemeClr val="bg1"/>
+                </a:solidFill>
+              </a:rPr>
+              <a:t>Normalize by user average rating</a:t>
+            </a:r>
+          </a:p>
+        </p:txBody>
+      </p:sp>
+    </p:spTree>
+    <p:extLst>
+      <p:ext uri="{BB962C8B-B14F-4D97-AF65-F5344CB8AC3E}">
+        <p14:creationId xmlns:p14="http://schemas.microsoft.com/office/powerpoint/2010/main" val="4128094917"/>
+      </p:ext>
+    </p:extLst>
+  </p:cSld>
+  <p:clrMapOvr>
+    <a:masterClrMapping/>
+  </p:clrMapOvr>
+</p:sld>
+</file>
+
+<file path=ppt/slides/slide7.xml><?xml version="1.0" encoding="utf-8"?>
+<p:sld xmlns:a="http://schemas.openxmlformats.org/drawingml/2006/main" xmlns:r="http://schemas.openxmlformats.org/officeDocument/2006/relationships" xmlns:p="http://schemas.openxmlformats.org/presentationml/2006/main">
+  <p:cSld>
+    <p:bg>
+      <p:bgPr>
+        <a:gradFill flip="none" rotWithShape="1">
+          <a:gsLst>
+            <a:gs pos="0">
+              <a:schemeClr val="bg1">
+                <a:lumMod val="75000"/>
+              </a:schemeClr>
+            </a:gs>
+            <a:gs pos="23000">
+              <a:schemeClr val="accent3">
+                <a:lumMod val="89000"/>
+              </a:schemeClr>
+            </a:gs>
+            <a:gs pos="69000">
+              <a:schemeClr val="accent3">
+                <a:lumMod val="75000"/>
+              </a:schemeClr>
+            </a:gs>
+            <a:gs pos="97000">
+              <a:schemeClr val="tx1">
+                <a:lumMod val="75000"/>
+                <a:lumOff val="25000"/>
+              </a:schemeClr>
+            </a:gs>
+          </a:gsLst>
+          <a:lin ang="16200000" scaled="1"/>
+          <a:tileRect/>
+        </a:gradFill>
+        <a:effectLst/>
+      </p:bgPr>
+    </p:bg>
+    <p:spTree>
+      <p:nvGrpSpPr>
+        <p:cNvPr id="1" name=""/>
+        <p:cNvGrpSpPr/>
+        <p:nvPr/>
+      </p:nvGrpSpPr>
+      <p:grpSpPr>
+        <a:xfrm>
+          <a:off x="0" y="0"/>
+          <a:ext cx="0" cy="0"/>
+          <a:chOff x="0" y="0"/>
+          <a:chExt cx="0" cy="0"/>
+        </a:xfrm>
+      </p:grpSpPr>
+      <p:sp>
+        <p:nvSpPr>
+          <p:cNvPr id="2" name="Title 1"/>
+          <p:cNvSpPr>
+            <a:spLocks noGrp="1"/>
+          </p:cNvSpPr>
+          <p:nvPr>
+            <p:ph type="ctrTitle"/>
+          </p:nvPr>
+        </p:nvSpPr>
+        <p:spPr>
+          <a:xfrm>
+            <a:off x="1524000" y="351652"/>
+            <a:ext cx="9144000" cy="876255"/>
+          </a:xfrm>
+        </p:spPr>
+        <p:txBody>
+          <a:bodyPr anchor="t">
+            <a:normAutofit fontScale="90000"/>
+          </a:bodyPr>
+          <a:lstStyle/>
+          <a:p>
+            <a:r>
+              <a:rPr lang="en-US" dirty="0">
+                <a:solidFill>
+                  <a:schemeClr val="bg1"/>
+                </a:solidFill>
+              </a:rPr>
               <a:t>Experimental Evaluation</a:t>
             </a:r>
           </a:p>
@@ -4372,7 +5317,7 @@
 </p:sld>
 </file>
 
-<file path=ppt/slides/slide7.xml><?xml version="1.0" encoding="utf-8"?>
+<file path=ppt/slides/slide8.xml><?xml version="1.0" encoding="utf-8"?>
 <p:sld xmlns:a="http://schemas.openxmlformats.org/drawingml/2006/main" xmlns:r="http://schemas.openxmlformats.org/officeDocument/2006/relationships" xmlns:p="http://schemas.openxmlformats.org/presentationml/2006/main">
   <p:cSld>
     <p:bg>

</xml_diff>